<commit_message>
add Klesia to clients list
</commit_message>
<xml_diff>
--- a/img/users.pptx
+++ b/img/users.pptx
@@ -304,7 +304,7 @@
           <a:p>
             <a:fld id="{25201A5A-F1CD-4217-B25E-E3072CDE9A3E}" type="datetimeFigureOut">
               <a:rPr lang="fr-FR" smtClean="0"/>
-              <a:t>28/04/2020</a:t>
+              <a:t>05/10/2020</a:t>
             </a:fld>
             <a:endParaRPr lang="fr-FR"/>
           </a:p>
@@ -474,7 +474,7 @@
           <a:p>
             <a:fld id="{25201A5A-F1CD-4217-B25E-E3072CDE9A3E}" type="datetimeFigureOut">
               <a:rPr lang="fr-FR" smtClean="0"/>
-              <a:t>28/04/2020</a:t>
+              <a:t>05/10/2020</a:t>
             </a:fld>
             <a:endParaRPr lang="fr-FR"/>
           </a:p>
@@ -654,7 +654,7 @@
           <a:p>
             <a:fld id="{25201A5A-F1CD-4217-B25E-E3072CDE9A3E}" type="datetimeFigureOut">
               <a:rPr lang="fr-FR" smtClean="0"/>
-              <a:t>28/04/2020</a:t>
+              <a:t>05/10/2020</a:t>
             </a:fld>
             <a:endParaRPr lang="fr-FR"/>
           </a:p>
@@ -824,7 +824,7 @@
           <a:p>
             <a:fld id="{25201A5A-F1CD-4217-B25E-E3072CDE9A3E}" type="datetimeFigureOut">
               <a:rPr lang="fr-FR" smtClean="0"/>
-              <a:t>28/04/2020</a:t>
+              <a:t>05/10/2020</a:t>
             </a:fld>
             <a:endParaRPr lang="fr-FR"/>
           </a:p>
@@ -1070,7 +1070,7 @@
           <a:p>
             <a:fld id="{25201A5A-F1CD-4217-B25E-E3072CDE9A3E}" type="datetimeFigureOut">
               <a:rPr lang="fr-FR" smtClean="0"/>
-              <a:t>28/04/2020</a:t>
+              <a:t>05/10/2020</a:t>
             </a:fld>
             <a:endParaRPr lang="fr-FR"/>
           </a:p>
@@ -1358,7 +1358,7 @@
           <a:p>
             <a:fld id="{25201A5A-F1CD-4217-B25E-E3072CDE9A3E}" type="datetimeFigureOut">
               <a:rPr lang="fr-FR" smtClean="0"/>
-              <a:t>28/04/2020</a:t>
+              <a:t>05/10/2020</a:t>
             </a:fld>
             <a:endParaRPr lang="fr-FR"/>
           </a:p>
@@ -1780,7 +1780,7 @@
           <a:p>
             <a:fld id="{25201A5A-F1CD-4217-B25E-E3072CDE9A3E}" type="datetimeFigureOut">
               <a:rPr lang="fr-FR" smtClean="0"/>
-              <a:t>28/04/2020</a:t>
+              <a:t>05/10/2020</a:t>
             </a:fld>
             <a:endParaRPr lang="fr-FR"/>
           </a:p>
@@ -1898,7 +1898,7 @@
           <a:p>
             <a:fld id="{25201A5A-F1CD-4217-B25E-E3072CDE9A3E}" type="datetimeFigureOut">
               <a:rPr lang="fr-FR" smtClean="0"/>
-              <a:t>28/04/2020</a:t>
+              <a:t>05/10/2020</a:t>
             </a:fld>
             <a:endParaRPr lang="fr-FR"/>
           </a:p>
@@ -1993,7 +1993,7 @@
           <a:p>
             <a:fld id="{25201A5A-F1CD-4217-B25E-E3072CDE9A3E}" type="datetimeFigureOut">
               <a:rPr lang="fr-FR" smtClean="0"/>
-              <a:t>28/04/2020</a:t>
+              <a:t>05/10/2020</a:t>
             </a:fld>
             <a:endParaRPr lang="fr-FR"/>
           </a:p>
@@ -2270,7 +2270,7 @@
           <a:p>
             <a:fld id="{25201A5A-F1CD-4217-B25E-E3072CDE9A3E}" type="datetimeFigureOut">
               <a:rPr lang="fr-FR" smtClean="0"/>
-              <a:t>28/04/2020</a:t>
+              <a:t>05/10/2020</a:t>
             </a:fld>
             <a:endParaRPr lang="fr-FR"/>
           </a:p>
@@ -2523,7 +2523,7 @@
           <a:p>
             <a:fld id="{25201A5A-F1CD-4217-B25E-E3072CDE9A3E}" type="datetimeFigureOut">
               <a:rPr lang="fr-FR" smtClean="0"/>
-              <a:t>28/04/2020</a:t>
+              <a:t>05/10/2020</a:t>
             </a:fld>
             <a:endParaRPr lang="fr-FR"/>
           </a:p>
@@ -2736,7 +2736,7 @@
           <a:p>
             <a:fld id="{25201A5A-F1CD-4217-B25E-E3072CDE9A3E}" type="datetimeFigureOut">
               <a:rPr lang="fr-FR" smtClean="0"/>
-              <a:t>28/04/2020</a:t>
+              <a:t>05/10/2020</a:t>
             </a:fld>
             <a:endParaRPr lang="fr-FR"/>
           </a:p>
@@ -3585,7 +3585,7 @@
         </p:blipFill>
         <p:spPr bwMode="auto">
           <a:xfrm>
-            <a:off x="1734142" y="3145655"/>
+            <a:off x="1097049" y="3164047"/>
             <a:ext cx="633412" cy="810335"/>
           </a:xfrm>
           <a:prstGeom prst="rect">
@@ -3626,7 +3626,7 @@
         </p:blipFill>
         <p:spPr bwMode="auto">
           <a:xfrm>
-            <a:off x="2978464" y="3130139"/>
+            <a:off x="3883754" y="3193085"/>
             <a:ext cx="634426" cy="793032"/>
           </a:xfrm>
           <a:prstGeom prst="rect">
@@ -3749,7 +3749,7 @@
         </p:blipFill>
         <p:spPr bwMode="auto">
           <a:xfrm>
-            <a:off x="4430664" y="3129047"/>
+            <a:off x="4683841" y="3164047"/>
             <a:ext cx="1080887" cy="777338"/>
           </a:xfrm>
           <a:prstGeom prst="rect">
@@ -4087,6 +4087,47 @@
           <a:prstGeom prst="rect">
             <a:avLst/>
           </a:prstGeom>
+        </p:spPr>
+      </p:pic>
+      <p:pic>
+        <p:nvPicPr>
+          <p:cNvPr id="5" name="Picture 2" descr="https://www.klesia.fr/sites/default/files/settings/logo-full-218x71.png"/>
+          <p:cNvPicPr>
+            <a:picLocks noChangeAspect="1" noChangeArrowheads="1"/>
+          </p:cNvPicPr>
+          <p:nvPr/>
+        </p:nvPicPr>
+        <p:blipFill>
+          <a:blip r:embed="rId26">
+            <a:extLst>
+              <a:ext uri="{28A0092B-C50C-407E-A947-70E740481C1C}">
+                <a14:useLocalDpi xmlns:a14="http://schemas.microsoft.com/office/drawing/2010/main" val="0"/>
+              </a:ext>
+            </a:extLst>
+          </a:blip>
+          <a:srcRect/>
+          <a:stretch>
+            <a:fillRect/>
+          </a:stretch>
+        </p:blipFill>
+        <p:spPr bwMode="auto">
+          <a:xfrm>
+            <a:off x="1711145" y="3286124"/>
+            <a:ext cx="2076450" cy="676276"/>
+          </a:xfrm>
+          <a:prstGeom prst="rect">
+            <a:avLst/>
+          </a:prstGeom>
+          <a:noFill/>
+          <a:extLst>
+            <a:ext uri="{909E8E84-426E-40DD-AFC4-6F175D3DCCD1}">
+              <a14:hiddenFill xmlns:a14="http://schemas.microsoft.com/office/drawing/2010/main">
+                <a:solidFill>
+                  <a:srgbClr val="FFFFFF"/>
+                </a:solidFill>
+              </a14:hiddenFill>
+            </a:ext>
+          </a:extLst>
         </p:spPr>
       </p:pic>
     </p:spTree>

</xml_diff>